<commit_message>
Seminar1 slide about Iterator pattern.
</commit_message>
<xml_diff>
--- a/Seminar1_slide.pptx
+++ b/Seminar1_slide.pptx
@@ -312,7 +312,7 @@
             <a:fld id="{FAB50F50-4B39-47E9-85E5-612EE8EFB717}" type="datetimeFigureOut">
               <a:rPr kumimoji="1" lang="ja-JP" altLang="en-US" smtClean="0"/>
               <a:pPr/>
-              <a:t>2012/10/25</a:t>
+              <a:t>2012/10/26</a:t>
             </a:fld>
             <a:endParaRPr kumimoji="1" lang="ja-JP" altLang="en-US"/>
           </a:p>
@@ -355,7 +355,7 @@
             <a:fld id="{DB3D5FEC-FE1C-4C2D-90E5-4D5A6063C2C6}" type="slidenum">
               <a:rPr kumimoji="1" lang="ja-JP" altLang="en-US" smtClean="0"/>
               <a:pPr/>
-              <a:t>&lt;#&gt;</a:t>
+              <a:t>‹#›</a:t>
             </a:fld>
             <a:endParaRPr kumimoji="1" lang="ja-JP" altLang="en-US"/>
           </a:p>
@@ -511,7 +511,7 @@
             <a:fld id="{FAB50F50-4B39-47E9-85E5-612EE8EFB717}" type="datetimeFigureOut">
               <a:rPr kumimoji="1" lang="ja-JP" altLang="en-US" smtClean="0"/>
               <a:pPr/>
-              <a:t>2012/10/25</a:t>
+              <a:t>2012/10/26</a:t>
             </a:fld>
             <a:endParaRPr kumimoji="1" lang="ja-JP" altLang="en-US"/>
           </a:p>
@@ -554,7 +554,7 @@
             <a:fld id="{DB3D5FEC-FE1C-4C2D-90E5-4D5A6063C2C6}" type="slidenum">
               <a:rPr kumimoji="1" lang="ja-JP" altLang="en-US" smtClean="0"/>
               <a:pPr/>
-              <a:t>&lt;#&gt;</a:t>
+              <a:t>‹#›</a:t>
             </a:fld>
             <a:endParaRPr kumimoji="1" lang="ja-JP" altLang="en-US"/>
           </a:p>
@@ -720,7 +720,7 @@
             <a:fld id="{FAB50F50-4B39-47E9-85E5-612EE8EFB717}" type="datetimeFigureOut">
               <a:rPr kumimoji="1" lang="ja-JP" altLang="en-US" smtClean="0"/>
               <a:pPr/>
-              <a:t>2012/10/25</a:t>
+              <a:t>2012/10/26</a:t>
             </a:fld>
             <a:endParaRPr kumimoji="1" lang="ja-JP" altLang="en-US"/>
           </a:p>
@@ -763,7 +763,7 @@
             <a:fld id="{DB3D5FEC-FE1C-4C2D-90E5-4D5A6063C2C6}" type="slidenum">
               <a:rPr kumimoji="1" lang="ja-JP" altLang="en-US" smtClean="0"/>
               <a:pPr/>
-              <a:t>&lt;#&gt;</a:t>
+              <a:t>‹#›</a:t>
             </a:fld>
             <a:endParaRPr kumimoji="1" lang="ja-JP" altLang="en-US"/>
           </a:p>
@@ -919,7 +919,7 @@
             <a:fld id="{FAB50F50-4B39-47E9-85E5-612EE8EFB717}" type="datetimeFigureOut">
               <a:rPr kumimoji="1" lang="ja-JP" altLang="en-US" smtClean="0"/>
               <a:pPr/>
-              <a:t>2012/10/25</a:t>
+              <a:t>2012/10/26</a:t>
             </a:fld>
             <a:endParaRPr kumimoji="1" lang="ja-JP" altLang="en-US"/>
           </a:p>
@@ -962,7 +962,7 @@
             <a:fld id="{DB3D5FEC-FE1C-4C2D-90E5-4D5A6063C2C6}" type="slidenum">
               <a:rPr kumimoji="1" lang="ja-JP" altLang="en-US" smtClean="0"/>
               <a:pPr/>
-              <a:t>&lt;#&gt;</a:t>
+              <a:t>‹#›</a:t>
             </a:fld>
             <a:endParaRPr kumimoji="1" lang="ja-JP" altLang="en-US"/>
           </a:p>
@@ -1162,7 +1162,7 @@
             <a:fld id="{FAB50F50-4B39-47E9-85E5-612EE8EFB717}" type="datetimeFigureOut">
               <a:rPr kumimoji="1" lang="ja-JP" altLang="en-US" smtClean="0"/>
               <a:pPr/>
-              <a:t>2012/10/25</a:t>
+              <a:t>2012/10/26</a:t>
             </a:fld>
             <a:endParaRPr kumimoji="1" lang="ja-JP" altLang="en-US"/>
           </a:p>
@@ -1205,7 +1205,7 @@
             <a:fld id="{DB3D5FEC-FE1C-4C2D-90E5-4D5A6063C2C6}" type="slidenum">
               <a:rPr kumimoji="1" lang="ja-JP" altLang="en-US" smtClean="0"/>
               <a:pPr/>
-              <a:t>&lt;#&gt;</a:t>
+              <a:t>‹#›</a:t>
             </a:fld>
             <a:endParaRPr kumimoji="1" lang="ja-JP" altLang="en-US"/>
           </a:p>
@@ -1511,7 +1511,7 @@
             <a:fld id="{FAB50F50-4B39-47E9-85E5-612EE8EFB717}" type="datetimeFigureOut">
               <a:rPr kumimoji="1" lang="ja-JP" altLang="en-US" smtClean="0"/>
               <a:pPr/>
-              <a:t>2012/10/25</a:t>
+              <a:t>2012/10/26</a:t>
             </a:fld>
             <a:endParaRPr kumimoji="1" lang="ja-JP" altLang="en-US"/>
           </a:p>
@@ -1554,7 +1554,7 @@
             <a:fld id="{DB3D5FEC-FE1C-4C2D-90E5-4D5A6063C2C6}" type="slidenum">
               <a:rPr kumimoji="1" lang="ja-JP" altLang="en-US" smtClean="0"/>
               <a:pPr/>
-              <a:t>&lt;#&gt;</a:t>
+              <a:t>‹#›</a:t>
             </a:fld>
             <a:endParaRPr kumimoji="1" lang="ja-JP" altLang="en-US"/>
           </a:p>
@@ -2006,7 +2006,7 @@
             <a:fld id="{FAB50F50-4B39-47E9-85E5-612EE8EFB717}" type="datetimeFigureOut">
               <a:rPr kumimoji="1" lang="ja-JP" altLang="en-US" smtClean="0"/>
               <a:pPr/>
-              <a:t>2012/10/25</a:t>
+              <a:t>2012/10/26</a:t>
             </a:fld>
             <a:endParaRPr kumimoji="1" lang="ja-JP" altLang="en-US"/>
           </a:p>
@@ -2049,7 +2049,7 @@
             <a:fld id="{DB3D5FEC-FE1C-4C2D-90E5-4D5A6063C2C6}" type="slidenum">
               <a:rPr kumimoji="1" lang="ja-JP" altLang="en-US" smtClean="0"/>
               <a:pPr/>
-              <a:t>&lt;#&gt;</a:t>
+              <a:t>‹#›</a:t>
             </a:fld>
             <a:endParaRPr kumimoji="1" lang="ja-JP" altLang="en-US"/>
           </a:p>
@@ -2121,7 +2121,7 @@
             <a:fld id="{FAB50F50-4B39-47E9-85E5-612EE8EFB717}" type="datetimeFigureOut">
               <a:rPr kumimoji="1" lang="ja-JP" altLang="en-US" smtClean="0"/>
               <a:pPr/>
-              <a:t>2012/10/25</a:t>
+              <a:t>2012/10/26</a:t>
             </a:fld>
             <a:endParaRPr kumimoji="1" lang="ja-JP" altLang="en-US"/>
           </a:p>
@@ -2164,7 +2164,7 @@
             <a:fld id="{DB3D5FEC-FE1C-4C2D-90E5-4D5A6063C2C6}" type="slidenum">
               <a:rPr kumimoji="1" lang="ja-JP" altLang="en-US" smtClean="0"/>
               <a:pPr/>
-              <a:t>&lt;#&gt;</a:t>
+              <a:t>‹#›</a:t>
             </a:fld>
             <a:endParaRPr kumimoji="1" lang="ja-JP" altLang="en-US"/>
           </a:p>
@@ -2213,7 +2213,7 @@
             <a:fld id="{FAB50F50-4B39-47E9-85E5-612EE8EFB717}" type="datetimeFigureOut">
               <a:rPr kumimoji="1" lang="ja-JP" altLang="en-US" smtClean="0"/>
               <a:pPr/>
-              <a:t>2012/10/25</a:t>
+              <a:t>2012/10/26</a:t>
             </a:fld>
             <a:endParaRPr kumimoji="1" lang="ja-JP" altLang="en-US"/>
           </a:p>
@@ -2256,7 +2256,7 @@
             <a:fld id="{DB3D5FEC-FE1C-4C2D-90E5-4D5A6063C2C6}" type="slidenum">
               <a:rPr kumimoji="1" lang="ja-JP" altLang="en-US" smtClean="0"/>
               <a:pPr/>
-              <a:t>&lt;#&gt;</a:t>
+              <a:t>‹#›</a:t>
             </a:fld>
             <a:endParaRPr kumimoji="1" lang="ja-JP" altLang="en-US"/>
           </a:p>
@@ -2404,7 +2404,7 @@
             <a:fld id="{FAB50F50-4B39-47E9-85E5-612EE8EFB717}" type="datetimeFigureOut">
               <a:rPr kumimoji="1" lang="ja-JP" altLang="en-US" smtClean="0"/>
               <a:pPr/>
-              <a:t>2012/10/25</a:t>
+              <a:t>2012/10/26</a:t>
             </a:fld>
             <a:endParaRPr kumimoji="1" lang="ja-JP" altLang="en-US"/>
           </a:p>
@@ -2447,7 +2447,7 @@
             <a:fld id="{DB3D5FEC-FE1C-4C2D-90E5-4D5A6063C2C6}" type="slidenum">
               <a:rPr kumimoji="1" lang="ja-JP" altLang="en-US" smtClean="0"/>
               <a:pPr/>
-              <a:t>&lt;#&gt;</a:t>
+              <a:t>‹#›</a:t>
             </a:fld>
             <a:endParaRPr kumimoji="1" lang="ja-JP" altLang="en-US"/>
           </a:p>
@@ -2756,7 +2756,7 @@
             <a:fld id="{FAB50F50-4B39-47E9-85E5-612EE8EFB717}" type="datetimeFigureOut">
               <a:rPr kumimoji="1" lang="ja-JP" altLang="en-US" smtClean="0"/>
               <a:pPr/>
-              <a:t>2012/10/25</a:t>
+              <a:t>2012/10/26</a:t>
             </a:fld>
             <a:endParaRPr kumimoji="1" lang="ja-JP" altLang="en-US"/>
           </a:p>
@@ -2780,7 +2780,7 @@
             <a:fld id="{DB3D5FEC-FE1C-4C2D-90E5-4D5A6063C2C6}" type="slidenum">
               <a:rPr kumimoji="1" lang="ja-JP" altLang="en-US" smtClean="0"/>
               <a:pPr/>
-              <a:t>&lt;#&gt;</a:t>
+              <a:t>‹#›</a:t>
             </a:fld>
             <a:endParaRPr kumimoji="1" lang="ja-JP" altLang="en-US"/>
           </a:p>
@@ -3095,7 +3095,7 @@
             <a:fld id="{DB3D5FEC-FE1C-4C2D-90E5-4D5A6063C2C6}" type="slidenum">
               <a:rPr kumimoji="1" lang="ja-JP" altLang="en-US" smtClean="0"/>
               <a:pPr/>
-              <a:t>&lt;#&gt;</a:t>
+              <a:t>‹#›</a:t>
             </a:fld>
             <a:endParaRPr kumimoji="1" lang="ja-JP" altLang="en-US"/>
           </a:p>
@@ -3170,7 +3170,7 @@
             <a:fld id="{FAB50F50-4B39-47E9-85E5-612EE8EFB717}" type="datetimeFigureOut">
               <a:rPr kumimoji="1" lang="ja-JP" altLang="en-US" smtClean="0"/>
               <a:pPr/>
-              <a:t>2012/10/25</a:t>
+              <a:t>2012/10/26</a:t>
             </a:fld>
             <a:endParaRPr kumimoji="1" lang="ja-JP" altLang="en-US"/>
           </a:p>
@@ -3512,7 +3512,15 @@
           <a:p>
             <a:r>
               <a:rPr kumimoji="1" lang="ja-JP" altLang="en-US" dirty="0" smtClean="0"/>
-              <a:t>力武研究室</a:t>
+              <a:t>力</a:t>
+            </a:r>
+            <a:r>
+              <a:rPr kumimoji="1" lang="ja-JP" altLang="en-US" smtClean="0"/>
+              <a:t>武</a:t>
+            </a:r>
+            <a:r>
+              <a:rPr kumimoji="1" lang="ja-JP" altLang="en-US" smtClean="0"/>
+              <a:t>研究室</a:t>
             </a:r>
             <a:r>
               <a:rPr lang="en-US" altLang="ja-JP" dirty="0"/>
@@ -3569,7 +3577,7 @@
     </p:spTree>
     <p:extLst>
       <p:ext uri="{BB962C8B-B14F-4D97-AF65-F5344CB8AC3E}">
-        <p14:creationId xmlns:p14="http://schemas.microsoft.com/office/powerpoint/2010/main" xmlns="" val="3069297865"/>
+        <p14:creationId xmlns:p14="http://schemas.microsoft.com/office/powerpoint/2010/main" val="3069297865"/>
       </p:ext>
     </p:extLst>
   </p:cSld>
@@ -3762,11 +3770,7 @@
             <a:pPr lvl="1"/>
             <a:r>
               <a:rPr lang="en-US" altLang="ja-JP" dirty="0" err="1" smtClean="0"/>
-              <a:t>i</a:t>
-            </a:r>
-            <a:r>
-              <a:rPr lang="en-US" altLang="ja-JP" dirty="0" err="1" smtClean="0"/>
-              <a:t>terator</a:t>
+              <a:t>iterator</a:t>
             </a:r>
             <a:r>
               <a:rPr lang="ja-JP" altLang="en-US" dirty="0" smtClean="0"/>
@@ -3872,11 +3876,7 @@
             <a:pPr lvl="1"/>
             <a:r>
               <a:rPr lang="ja-JP" altLang="en-US" dirty="0" smtClean="0"/>
-              <a:t>スキャン処理で</a:t>
-            </a:r>
-            <a:r>
-              <a:rPr lang="ja-JP" altLang="en-US" dirty="0" smtClean="0"/>
-              <a:t>は</a:t>
+              <a:t>スキャン処理では</a:t>
             </a:r>
             <a:r>
               <a:rPr lang="en-US" altLang="ja-JP" dirty="0" err="1" smtClean="0"/>
@@ -3939,11 +3939,7 @@
             </a:pPr>
             <a:r>
               <a:rPr lang="en-US" altLang="ja-JP" dirty="0" smtClean="0"/>
-              <a:t>	</a:t>
-            </a:r>
-            <a:r>
-              <a:rPr lang="en-US" altLang="ja-JP" dirty="0" smtClean="0"/>
-              <a:t>			Book books = (Book)</a:t>
+              <a:t>				Book books = (Book)</a:t>
             </a:r>
             <a:r>
               <a:rPr lang="en-US" altLang="ja-JP" dirty="0" err="1" smtClean="0"/>
@@ -3964,11 +3960,7 @@
             </a:pPr>
             <a:r>
               <a:rPr lang="en-US" altLang="ja-JP" dirty="0" smtClean="0"/>
-              <a:t>	</a:t>
-            </a:r>
-            <a:r>
-              <a:rPr lang="en-US" altLang="ja-JP" dirty="0" smtClean="0"/>
-              <a:t>			</a:t>
+              <a:t>				</a:t>
             </a:r>
             <a:r>
               <a:rPr lang="en-US" altLang="ja-JP" dirty="0" err="1" smtClean="0"/>
@@ -3993,11 +3985,7 @@
             </a:pPr>
             <a:r>
               <a:rPr lang="en-US" altLang="ja-JP" dirty="0" smtClean="0"/>
-              <a:t>	</a:t>
-            </a:r>
-            <a:r>
-              <a:rPr lang="en-US" altLang="ja-JP" dirty="0" smtClean="0"/>
-              <a:t>		}</a:t>
+              <a:t>			}</a:t>
             </a:r>
           </a:p>
           <a:p>
@@ -4116,15 +4104,7 @@
             </a:r>
             <a:r>
               <a:rPr lang="ja-JP" altLang="en-US" sz="2200" dirty="0" smtClean="0"/>
-              <a:t>パターンを使い回</a:t>
-            </a:r>
-            <a:r>
-              <a:rPr lang="ja-JP" altLang="en-US" sz="2200" dirty="0" smtClean="0"/>
-              <a:t>す</a:t>
-            </a:r>
-            <a:r>
-              <a:rPr lang="ja-JP" altLang="en-US" sz="2200" dirty="0" smtClean="0"/>
-              <a:t>ことにより、どんな</a:t>
+              <a:t>パターンを使い回すことにより、どんな</a:t>
             </a:r>
             <a:endParaRPr lang="en-US" altLang="ja-JP" sz="2200" dirty="0" smtClean="0"/>
           </a:p>
@@ -4896,19 +4876,7 @@
             </a:r>
             <a:r>
               <a:rPr lang="ja-JP" altLang="en-US" dirty="0" smtClean="0"/>
-              <a:t>する時</a:t>
-            </a:r>
-            <a:r>
-              <a:rPr lang="ja-JP" altLang="en-US" dirty="0" smtClean="0"/>
-              <a:t>に</a:t>
-            </a:r>
-            <a:r>
-              <a:rPr lang="ja-JP" altLang="en-US" dirty="0" smtClean="0"/>
-              <a:t>用いる</a:t>
-            </a:r>
-            <a:r>
-              <a:rPr lang="ja-JP" altLang="en-US" dirty="0" smtClean="0"/>
-              <a:t>。</a:t>
+              <a:t>する時に用いる。</a:t>
             </a:r>
             <a:endParaRPr lang="en-US" altLang="ja-JP" dirty="0" smtClean="0"/>
           </a:p>
@@ -4932,7 +4900,7 @@
     </p:spTree>
     <p:extLst>
       <p:ext uri="{BB962C8B-B14F-4D97-AF65-F5344CB8AC3E}">
-        <p14:creationId xmlns:p14="http://schemas.microsoft.com/office/powerpoint/2010/main" xmlns="" val="1987487253"/>
+        <p14:creationId xmlns:p14="http://schemas.microsoft.com/office/powerpoint/2010/main" val="1987487253"/>
       </p:ext>
     </p:extLst>
   </p:cSld>
@@ -5022,11 +4990,7 @@
             <a:pPr lvl="1"/>
             <a:r>
               <a:rPr lang="ja-JP" altLang="en-US" dirty="0" smtClean="0"/>
-              <a:t>集</a:t>
-            </a:r>
-            <a:r>
-              <a:rPr lang="ja-JP" altLang="en-US" dirty="0" smtClean="0"/>
-              <a:t>合体：本棚</a:t>
+              <a:t>集合体：本棚</a:t>
             </a:r>
             <a:endParaRPr lang="en-US" altLang="ja-JP" dirty="0" smtClean="0"/>
           </a:p>
@@ -5034,11 +4998,7 @@
             <a:pPr lvl="1"/>
             <a:r>
               <a:rPr lang="ja-JP" altLang="en-US" dirty="0" smtClean="0"/>
-              <a:t>集</a:t>
-            </a:r>
-            <a:r>
-              <a:rPr lang="ja-JP" altLang="en-US" dirty="0" smtClean="0"/>
-              <a:t>合体の要素：本</a:t>
+              <a:t>集合体の要素：本</a:t>
             </a:r>
             <a:endParaRPr lang="en-US" altLang="ja-JP" dirty="0" smtClean="0"/>
           </a:p>
@@ -5204,11 +5164,7 @@
             </a:r>
             <a:r>
               <a:rPr lang="ja-JP" altLang="en-US" dirty="0" smtClean="0"/>
-              <a:t>の役割を果たすインターフェース</a:t>
-            </a:r>
-            <a:r>
-              <a:rPr lang="ja-JP" altLang="en-US" dirty="0" smtClean="0"/>
-              <a:t>。</a:t>
+              <a:t>の役割を果たすインターフェース。</a:t>
             </a:r>
             <a:endParaRPr lang="en-US" altLang="ja-JP" dirty="0" smtClean="0"/>
           </a:p>
@@ -5421,7 +5377,7 @@
     </p:spTree>
     <p:extLst>
       <p:ext uri="{BB962C8B-B14F-4D97-AF65-F5344CB8AC3E}">
-        <p14:creationId xmlns:p14="http://schemas.microsoft.com/office/powerpoint/2010/main" xmlns="" val="1137824190"/>
+        <p14:creationId xmlns:p14="http://schemas.microsoft.com/office/powerpoint/2010/main" val="1137824190"/>
       </p:ext>
     </p:extLst>
   </p:cSld>
@@ -5607,7 +5563,7 @@
     </p:spTree>
     <p:extLst>
       <p:ext uri="{BB962C8B-B14F-4D97-AF65-F5344CB8AC3E}">
-        <p14:creationId xmlns:p14="http://schemas.microsoft.com/office/powerpoint/2010/main" xmlns="" val="1479653270"/>
+        <p14:creationId xmlns:p14="http://schemas.microsoft.com/office/powerpoint/2010/main" val="1479653270"/>
       </p:ext>
     </p:extLst>
   </p:cSld>
@@ -5858,19 +5814,7 @@
             </a:r>
             <a:r>
               <a:rPr lang="ja-JP" altLang="en-US" dirty="0" smtClean="0"/>
-              <a:t>　最後</a:t>
-            </a:r>
-            <a:r>
-              <a:rPr lang="ja-JP" altLang="en-US" dirty="0" smtClean="0"/>
-              <a:t>に</a:t>
-            </a:r>
-            <a:r>
-              <a:rPr lang="ja-JP" altLang="en-US" dirty="0" smtClean="0"/>
-              <a:t>追加</a:t>
-            </a:r>
-            <a:r>
-              <a:rPr lang="ja-JP" altLang="en-US" dirty="0" smtClean="0"/>
-              <a:t>。</a:t>
+              <a:t>　最後に追加。</a:t>
             </a:r>
             <a:endParaRPr lang="en-US" altLang="ja-JP" dirty="0"/>
           </a:p>
@@ -5944,7 +5888,7 @@
     </p:spTree>
     <p:extLst>
       <p:ext uri="{BB962C8B-B14F-4D97-AF65-F5344CB8AC3E}">
-        <p14:creationId xmlns:p14="http://schemas.microsoft.com/office/powerpoint/2010/main" xmlns="" val="3961615567"/>
+        <p14:creationId xmlns:p14="http://schemas.microsoft.com/office/powerpoint/2010/main" val="3961615567"/>
       </p:ext>
     </p:extLst>
   </p:cSld>
@@ -6247,7 +6191,7 @@
     </p:spTree>
     <p:extLst>
       <p:ext uri="{BB962C8B-B14F-4D97-AF65-F5344CB8AC3E}">
-        <p14:creationId xmlns:p14="http://schemas.microsoft.com/office/powerpoint/2010/main" xmlns="" val="591471788"/>
+        <p14:creationId xmlns:p14="http://schemas.microsoft.com/office/powerpoint/2010/main" val="591471788"/>
       </p:ext>
     </p:extLst>
   </p:cSld>
@@ -6333,15 +6277,7 @@
             <a:pPr lvl="1"/>
             <a:r>
               <a:rPr lang="ja-JP" altLang="en-US" dirty="0" smtClean="0"/>
-              <a:t>実際に</a:t>
-            </a:r>
-            <a:r>
-              <a:rPr lang="ja-JP" altLang="en-US" dirty="0" smtClean="0"/>
-              <a:t>本棚</a:t>
-            </a:r>
-            <a:r>
-              <a:rPr lang="ja-JP" altLang="en-US" dirty="0" smtClean="0"/>
-              <a:t>に本を格納し、全ての本を順番にスキャンするクラス。</a:t>
+              <a:t>実際に本棚に本を格納し、全ての本を順番にスキャンするクラス。</a:t>
             </a:r>
             <a:endParaRPr lang="en-US" altLang="ja-JP" dirty="0" smtClean="0"/>
           </a:p>
@@ -6353,11 +6289,7 @@
             </a:r>
             <a:r>
               <a:rPr lang="ja-JP" altLang="en-US" dirty="0" smtClean="0"/>
-              <a:t>本</a:t>
-            </a:r>
-            <a:r>
-              <a:rPr lang="ja-JP" altLang="en-US" dirty="0" smtClean="0"/>
-              <a:t>の最大数</a:t>
+              <a:t>本の最大数</a:t>
             </a:r>
             <a:r>
               <a:rPr lang="en-US" altLang="ja-JP" dirty="0" smtClean="0"/>
@@ -6458,7 +6390,7 @@
     </p:spTree>
     <p:extLst>
       <p:ext uri="{BB962C8B-B14F-4D97-AF65-F5344CB8AC3E}">
-        <p14:creationId xmlns:p14="http://schemas.microsoft.com/office/powerpoint/2010/main" xmlns="" val="3336788293"/>
+        <p14:creationId xmlns:p14="http://schemas.microsoft.com/office/powerpoint/2010/main" val="3336788293"/>
       </p:ext>
     </p:extLst>
   </p:cSld>
@@ -6609,19 +6541,7 @@
             </a:r>
             <a:r>
               <a:rPr lang="ja-JP" altLang="en-US" dirty="0" smtClean="0"/>
-              <a:t>メソッドの処理</a:t>
-            </a:r>
-            <a:r>
-              <a:rPr lang="ja-JP" altLang="en-US" dirty="0" smtClean="0"/>
-              <a:t>内容はここでは記述</a:t>
-            </a:r>
-            <a:r>
-              <a:rPr lang="ja-JP" altLang="en-US" dirty="0" smtClean="0"/>
-              <a:t>して</a:t>
-            </a:r>
-            <a:r>
-              <a:rPr lang="ja-JP" altLang="en-US" dirty="0" smtClean="0"/>
-              <a:t>いない！</a:t>
+              <a:t>メソッドの処理内容はここでは記述していない！</a:t>
             </a:r>
             <a:endParaRPr kumimoji="1" lang="en-US" altLang="ja-JP" dirty="0" smtClean="0"/>
           </a:p>

</xml_diff>